<commit_message>
add 29th and modify 11,24,28th
</commit_message>
<xml_diff>
--- a/R/スライド/第11回.pptx
+++ b/R/スライド/第11回.pptx
@@ -379,7 +379,7 @@
           <a:p>
             <a:fld id="{DC6405C4-C66D-F749-86C2-C6C1EA8BBE39}" type="datetimeFigureOut">
               <a:rPr kumimoji="1" lang="ja-JP" altLang="en-US" smtClean="0"/>
-              <a:t>2020/12/20</a:t>
+              <a:t>2021/11/30</a:t>
             </a:fld>
             <a:endParaRPr kumimoji="1" lang="ja-JP" altLang="en-US"/>
           </a:p>
@@ -993,7 +993,7 @@
           <a:p>
             <a:fld id="{1AD62F61-7A67-4348-90E6-B5BD2C8127A3}" type="datetimeFigureOut">
               <a:rPr kumimoji="1" lang="ja-JP" altLang="en-US" smtClean="0"/>
-              <a:t>2020/12/20</a:t>
+              <a:t>2021/11/30</a:t>
             </a:fld>
             <a:endParaRPr kumimoji="1" lang="ja-JP" altLang="en-US"/>
           </a:p>
@@ -1223,7 +1223,7 @@
           <a:p>
             <a:fld id="{1AD62F61-7A67-4348-90E6-B5BD2C8127A3}" type="datetimeFigureOut">
               <a:rPr kumimoji="1" lang="ja-JP" altLang="en-US" smtClean="0"/>
-              <a:t>2020/12/20</a:t>
+              <a:t>2021/11/30</a:t>
             </a:fld>
             <a:endParaRPr kumimoji="1" lang="ja-JP" altLang="en-US"/>
           </a:p>
@@ -1463,7 +1463,7 @@
           <a:p>
             <a:fld id="{1AD62F61-7A67-4348-90E6-B5BD2C8127A3}" type="datetimeFigureOut">
               <a:rPr kumimoji="1" lang="ja-JP" altLang="en-US" smtClean="0"/>
-              <a:t>2020/12/20</a:t>
+              <a:t>2021/11/30</a:t>
             </a:fld>
             <a:endParaRPr kumimoji="1" lang="ja-JP" altLang="en-US"/>
           </a:p>
@@ -1693,7 +1693,7 @@
           <a:p>
             <a:fld id="{1AD62F61-7A67-4348-90E6-B5BD2C8127A3}" type="datetimeFigureOut">
               <a:rPr kumimoji="1" lang="ja-JP" altLang="en-US" smtClean="0"/>
-              <a:t>2020/12/20</a:t>
+              <a:t>2021/11/30</a:t>
             </a:fld>
             <a:endParaRPr kumimoji="1" lang="ja-JP" altLang="en-US"/>
           </a:p>
@@ -1968,7 +1968,7 @@
           <a:p>
             <a:fld id="{1AD62F61-7A67-4348-90E6-B5BD2C8127A3}" type="datetimeFigureOut">
               <a:rPr kumimoji="1" lang="ja-JP" altLang="en-US" smtClean="0"/>
-              <a:t>2020/12/20</a:t>
+              <a:t>2021/11/30</a:t>
             </a:fld>
             <a:endParaRPr kumimoji="1" lang="ja-JP" altLang="en-US"/>
           </a:p>
@@ -2297,7 +2297,7 @@
           <a:p>
             <a:fld id="{1AD62F61-7A67-4348-90E6-B5BD2C8127A3}" type="datetimeFigureOut">
               <a:rPr kumimoji="1" lang="ja-JP" altLang="en-US" smtClean="0"/>
-              <a:t>2020/12/20</a:t>
+              <a:t>2021/11/30</a:t>
             </a:fld>
             <a:endParaRPr kumimoji="1" lang="ja-JP" altLang="en-US"/>
           </a:p>
@@ -2773,7 +2773,7 @@
           <a:p>
             <a:fld id="{1AD62F61-7A67-4348-90E6-B5BD2C8127A3}" type="datetimeFigureOut">
               <a:rPr kumimoji="1" lang="ja-JP" altLang="en-US" smtClean="0"/>
-              <a:t>2020/12/20</a:t>
+              <a:t>2021/11/30</a:t>
             </a:fld>
             <a:endParaRPr kumimoji="1" lang="ja-JP" altLang="en-US"/>
           </a:p>
@@ -2914,7 +2914,7 @@
           <a:p>
             <a:fld id="{1AD62F61-7A67-4348-90E6-B5BD2C8127A3}" type="datetimeFigureOut">
               <a:rPr kumimoji="1" lang="ja-JP" altLang="en-US" smtClean="0"/>
-              <a:t>2020/12/20</a:t>
+              <a:t>2021/11/30</a:t>
             </a:fld>
             <a:endParaRPr kumimoji="1" lang="ja-JP" altLang="en-US"/>
           </a:p>
@@ -3027,7 +3027,7 @@
           <a:p>
             <a:fld id="{1AD62F61-7A67-4348-90E6-B5BD2C8127A3}" type="datetimeFigureOut">
               <a:rPr kumimoji="1" lang="ja-JP" altLang="en-US" smtClean="0"/>
-              <a:t>2020/12/20</a:t>
+              <a:t>2021/11/30</a:t>
             </a:fld>
             <a:endParaRPr kumimoji="1" lang="ja-JP" altLang="en-US"/>
           </a:p>
@@ -3370,7 +3370,7 @@
           <a:p>
             <a:fld id="{1AD62F61-7A67-4348-90E6-B5BD2C8127A3}" type="datetimeFigureOut">
               <a:rPr kumimoji="1" lang="ja-JP" altLang="en-US" smtClean="0"/>
-              <a:t>2020/12/20</a:t>
+              <a:t>2021/11/30</a:t>
             </a:fld>
             <a:endParaRPr kumimoji="1" lang="ja-JP" altLang="en-US"/>
           </a:p>
@@ -3658,7 +3658,7 @@
           <a:p>
             <a:fld id="{1AD62F61-7A67-4348-90E6-B5BD2C8127A3}" type="datetimeFigureOut">
               <a:rPr kumimoji="1" lang="ja-JP" altLang="en-US" smtClean="0"/>
-              <a:t>2020/12/20</a:t>
+              <a:t>2021/11/30</a:t>
             </a:fld>
             <a:endParaRPr kumimoji="1" lang="ja-JP" altLang="en-US"/>
           </a:p>
@@ -3931,7 +3931,7 @@
           <a:p>
             <a:fld id="{1AD62F61-7A67-4348-90E6-B5BD2C8127A3}" type="datetimeFigureOut">
               <a:rPr kumimoji="1" lang="ja-JP" altLang="en-US" smtClean="0"/>
-              <a:t>2020/12/20</a:t>
+              <a:t>2021/11/30</a:t>
             </a:fld>
             <a:endParaRPr kumimoji="1" lang="ja-JP" altLang="en-US"/>
           </a:p>
@@ -5254,6 +5254,9 @@
           <a:prstGeom prst="ellipse">
             <a:avLst/>
           </a:prstGeom>
+          <a:solidFill>
+            <a:srgbClr val="002060"/>
+          </a:solidFill>
         </p:spPr>
         <p:style>
           <a:lnRef idx="2">
@@ -5333,13 +5336,15 @@
               </a:ext>
             </a:extLst>
           </p:cNvPr>
-          <p:cNvCxnSpPr/>
+          <p:cNvCxnSpPr>
+            <a:cxnSpLocks/>
+          </p:cNvCxnSpPr>
           <p:nvPr/>
         </p:nvCxnSpPr>
         <p:spPr>
           <a:xfrm>
-            <a:off x="1766110" y="3543956"/>
-            <a:ext cx="85061" cy="1431943"/>
+            <a:off x="1749287" y="3748645"/>
+            <a:ext cx="101884" cy="1227254"/>
           </a:xfrm>
           <a:prstGeom prst="straightConnector1">
             <a:avLst/>

</xml_diff>